<commit_message>
Delete old codebook files
#13
During our research meeting today, Brad deleted a bunch of old code book files.
</commit_message>
<xml_diff>
--- a/docs/DETECT FU Interview Data.pptx
+++ b/docs/DETECT FU Interview Data.pptx
@@ -116,7 +116,49 @@
       </a:defRPr>
     </a:lvl9pPr>
   </p:defaultTextStyle>
+  <p:extLst>
+    <p:ext uri="{EFAFB233-063F-42B5-8137-9DF3F51BA10A}">
+      <p15:sldGuideLst xmlns:p15="http://schemas.microsoft.com/office/powerpoint/2012/main"/>
+    </p:ext>
+  </p:extLst>
 </p:presentation>
+</file>
+
+<file path=ppt/revisionInfo.xml><?xml version="1.0" encoding="utf-8"?>
+<p1510:revInfo xmlns:a="http://schemas.openxmlformats.org/drawingml/2006/main" xmlns:r="http://schemas.openxmlformats.org/officeDocument/2006/relationships" xmlns:p1510="http://schemas.microsoft.com/office/powerpoint/2015/10/main">
+  <p1510:revLst>
+    <p1510:client id="{CA0B7129-B690-39DD-FB38-12A1E3706AC6}" v="2" dt="2023-03-06T22:33:21.564"/>
+  </p1510:revLst>
+</p1510:revInfo>
+</file>
+
+<file path=ppt/changesInfos/changesInfo1.xml><?xml version="1.0" encoding="utf-8"?>
+<pc:chgInfo xmlns:a="http://schemas.openxmlformats.org/drawingml/2006/main" xmlns:r="http://schemas.openxmlformats.org/officeDocument/2006/relationships" xmlns:ac="http://schemas.microsoft.com/office/drawing/2013/main/command" xmlns:pc="http://schemas.microsoft.com/office/powerpoint/2013/main/command">
+  <pc:docChgLst>
+    <pc:chgData name="Cannell, Michael B" userId="S::michael.b.cannell@uth.tmc.edu::df291291-9ac9-42c2-a976-062f6e2ad9da" providerId="AD" clId="Web-{CA0B7129-B690-39DD-FB38-12A1E3706AC6}"/>
+    <pc:docChg chg="modSld">
+      <pc:chgData name="Cannell, Michael B" userId="S::michael.b.cannell@uth.tmc.edu::df291291-9ac9-42c2-a976-062f6e2ad9da" providerId="AD" clId="Web-{CA0B7129-B690-39DD-FB38-12A1E3706AC6}" dt="2023-03-06T22:33:21.564" v="1" actId="20577"/>
+      <pc:docMkLst>
+        <pc:docMk/>
+      </pc:docMkLst>
+      <pc:sldChg chg="modSp">
+        <pc:chgData name="Cannell, Michael B" userId="S::michael.b.cannell@uth.tmc.edu::df291291-9ac9-42c2-a976-062f6e2ad9da" providerId="AD" clId="Web-{CA0B7129-B690-39DD-FB38-12A1E3706AC6}" dt="2023-03-06T22:33:21.564" v="1" actId="20577"/>
+        <pc:sldMkLst>
+          <pc:docMk/>
+          <pc:sldMk cId="3385795895" sldId="259"/>
+        </pc:sldMkLst>
+        <pc:spChg chg="mod">
+          <ac:chgData name="Cannell, Michael B" userId="S::michael.b.cannell@uth.tmc.edu::df291291-9ac9-42c2-a976-062f6e2ad9da" providerId="AD" clId="Web-{CA0B7129-B690-39DD-FB38-12A1E3706AC6}" dt="2023-03-06T22:33:21.564" v="1" actId="20577"/>
+          <ac:spMkLst>
+            <pc:docMk/>
+            <pc:sldMk cId="3385795895" sldId="259"/>
+            <ac:spMk id="3" creationId="{874A9A2E-6167-B294-D320-D7DB428EF067}"/>
+          </ac:spMkLst>
+        </pc:spChg>
+      </pc:sldChg>
+    </pc:docChg>
+  </pc:docChgLst>
+</pc:chgInfo>
 </file>
 
 <file path=ppt/slideLayouts/slideLayout1.xml><?xml version="1.0" encoding="utf-8"?>
@@ -266,7 +308,7 @@
           <a:p>
             <a:fld id="{C7C054E5-E714-C54D-A640-D65F6C385809}" type="datetimeFigureOut">
               <a:rPr lang="en-US" smtClean="0"/>
-              <a:t>3/5/23</a:t>
+              <a:t>3/6/2023</a:t>
             </a:fld>
             <a:endParaRPr lang="en-US"/>
           </a:p>
@@ -464,7 +506,7 @@
           <a:p>
             <a:fld id="{C7C054E5-E714-C54D-A640-D65F6C385809}" type="datetimeFigureOut">
               <a:rPr lang="en-US" smtClean="0"/>
-              <a:t>3/5/23</a:t>
+              <a:t>3/6/2023</a:t>
             </a:fld>
             <a:endParaRPr lang="en-US"/>
           </a:p>
@@ -672,7 +714,7 @@
           <a:p>
             <a:fld id="{C7C054E5-E714-C54D-A640-D65F6C385809}" type="datetimeFigureOut">
               <a:rPr lang="en-US" smtClean="0"/>
-              <a:t>3/5/23</a:t>
+              <a:t>3/6/2023</a:t>
             </a:fld>
             <a:endParaRPr lang="en-US"/>
           </a:p>
@@ -870,7 +912,7 @@
           <a:p>
             <a:fld id="{C7C054E5-E714-C54D-A640-D65F6C385809}" type="datetimeFigureOut">
               <a:rPr lang="en-US" smtClean="0"/>
-              <a:t>3/5/23</a:t>
+              <a:t>3/6/2023</a:t>
             </a:fld>
             <a:endParaRPr lang="en-US"/>
           </a:p>
@@ -1145,7 +1187,7 @@
           <a:p>
             <a:fld id="{C7C054E5-E714-C54D-A640-D65F6C385809}" type="datetimeFigureOut">
               <a:rPr lang="en-US" smtClean="0"/>
-              <a:t>3/5/23</a:t>
+              <a:t>3/6/2023</a:t>
             </a:fld>
             <a:endParaRPr lang="en-US"/>
           </a:p>
@@ -1410,7 +1452,7 @@
           <a:p>
             <a:fld id="{C7C054E5-E714-C54D-A640-D65F6C385809}" type="datetimeFigureOut">
               <a:rPr lang="en-US" smtClean="0"/>
-              <a:t>3/5/23</a:t>
+              <a:t>3/6/2023</a:t>
             </a:fld>
             <a:endParaRPr lang="en-US"/>
           </a:p>
@@ -1822,7 +1864,7 @@
           <a:p>
             <a:fld id="{C7C054E5-E714-C54D-A640-D65F6C385809}" type="datetimeFigureOut">
               <a:rPr lang="en-US" smtClean="0"/>
-              <a:t>3/5/23</a:t>
+              <a:t>3/6/2023</a:t>
             </a:fld>
             <a:endParaRPr lang="en-US"/>
           </a:p>
@@ -1963,7 +2005,7 @@
           <a:p>
             <a:fld id="{C7C054E5-E714-C54D-A640-D65F6C385809}" type="datetimeFigureOut">
               <a:rPr lang="en-US" smtClean="0"/>
-              <a:t>3/5/23</a:t>
+              <a:t>3/6/2023</a:t>
             </a:fld>
             <a:endParaRPr lang="en-US"/>
           </a:p>
@@ -2076,7 +2118,7 @@
           <a:p>
             <a:fld id="{C7C054E5-E714-C54D-A640-D65F6C385809}" type="datetimeFigureOut">
               <a:rPr lang="en-US" smtClean="0"/>
-              <a:t>3/5/23</a:t>
+              <a:t>3/6/2023</a:t>
             </a:fld>
             <a:endParaRPr lang="en-US"/>
           </a:p>
@@ -2387,7 +2429,7 @@
           <a:p>
             <a:fld id="{C7C054E5-E714-C54D-A640-D65F6C385809}" type="datetimeFigureOut">
               <a:rPr lang="en-US" smtClean="0"/>
-              <a:t>3/5/23</a:t>
+              <a:t>3/6/2023</a:t>
             </a:fld>
             <a:endParaRPr lang="en-US"/>
           </a:p>
@@ -2675,7 +2717,7 @@
           <a:p>
             <a:fld id="{C7C054E5-E714-C54D-A640-D65F6C385809}" type="datetimeFigureOut">
               <a:rPr lang="en-US" smtClean="0"/>
-              <a:t>3/5/23</a:t>
+              <a:t>3/6/2023</a:t>
             </a:fld>
             <a:endParaRPr lang="en-US"/>
           </a:p>
@@ -2916,7 +2958,7 @@
           <a:p>
             <a:fld id="{C7C054E5-E714-C54D-A640-D65F6C385809}" type="datetimeFigureOut">
               <a:rPr lang="en-US" smtClean="0"/>
-              <a:t>3/5/23</a:t>
+              <a:t>3/6/2023</a:t>
             </a:fld>
             <a:endParaRPr lang="en-US"/>
           </a:p>
@@ -4264,7 +4306,9 @@
         </p:nvSpPr>
         <p:spPr/>
         <p:txBody>
-          <a:bodyPr/>
+          <a:bodyPr vert="horz" lIns="91440" tIns="45720" rIns="91440" bIns="45720" rtlCol="0" anchor="t">
+            <a:normAutofit/>
+          </a:bodyPr>
           <a:lstStyle/>
           <a:p>
             <a:r>

</xml_diff>